<commit_message>
[IV] Improve Motivation Slide - Dear Data presentation
</commit_message>
<xml_diff>
--- a/courses/iv/dear_data/presentation.pptx
+++ b/courses/iv/dear_data/presentation.pptx
@@ -3383,8 +3383,8 @@
         </p:nvSpPr>
         <p:spPr>
           <a:xfrm flipH="false" flipV="false" rot="0">
-            <a:off x="2857500" y="0"/>
-            <a:ext cx="15430500" cy="10287000"/>
+            <a:off x="2851470" y="0"/>
+            <a:ext cx="15436530" cy="10287000"/>
           </a:xfrm>
           <a:custGeom>
             <a:avLst/>
@@ -3393,15 +3393,15 @@
             <a:cxnLst/>
             <a:rect r="r" b="b" t="t" l="l"/>
             <a:pathLst>
-              <a:path h="10287000" w="15430500">
+              <a:path h="10287000" w="15436530">
                 <a:moveTo>
                   <a:pt x="0" y="0"/>
                 </a:moveTo>
                 <a:lnTo>
-                  <a:pt x="15430500" y="0"/>
+                  <a:pt x="15436530" y="0"/>
                 </a:lnTo>
                 <a:lnTo>
-                  <a:pt x="15430500" y="10287000"/>
+                  <a:pt x="15436530" y="10287000"/>
                 </a:lnTo>
                 <a:lnTo>
                   <a:pt x="0" y="10287000"/>
@@ -3429,7 +3429,7 @@
         </p:nvSpPr>
         <p:spPr>
           <a:xfrm rot="0">
-            <a:off x="1028700" y="8771741"/>
+            <a:off x="1028700" y="8008957"/>
             <a:ext cx="7924800" cy="1249343"/>
           </a:xfrm>
           <a:prstGeom prst="rect">
@@ -5134,7 +5134,7 @@
         </p:nvSpPr>
         <p:spPr>
           <a:xfrm flipH="false" flipV="false" rot="0">
-            <a:off x="10595751" y="1529149"/>
+            <a:off x="11284414" y="1529149"/>
             <a:ext cx="6663549" cy="7228702"/>
           </a:xfrm>
           <a:custGeom>

</xml_diff>

<commit_message>
[IV] Add DearData presentation
</commit_message>
<xml_diff>
--- a/courses/iv/dear_data/presentation.pptx
+++ b/courses/iv/dear_data/presentation.pptx
@@ -5134,8 +5134,8 @@
         </p:nvSpPr>
         <p:spPr>
           <a:xfrm flipH="false" flipV="false" rot="0">
-            <a:off x="11284414" y="1529149"/>
-            <a:ext cx="6663549" cy="7228702"/>
+            <a:off x="12076720" y="2237186"/>
+            <a:ext cx="5182580" cy="5622128"/>
           </a:xfrm>
           <a:custGeom>
             <a:avLst/>
@@ -5144,18 +5144,18 @@
             <a:cxnLst/>
             <a:rect r="r" b="b" t="t" l="l"/>
             <a:pathLst>
-              <a:path h="7228702" w="6663549">
+              <a:path h="5622128" w="5182580">
                 <a:moveTo>
                   <a:pt x="0" y="0"/>
                 </a:moveTo>
                 <a:lnTo>
-                  <a:pt x="6663549" y="0"/>
+                  <a:pt x="5182580" y="0"/>
                 </a:lnTo>
                 <a:lnTo>
-                  <a:pt x="6663549" y="7228702"/>
+                  <a:pt x="5182580" y="5622128"/>
                 </a:lnTo>
                 <a:lnTo>
-                  <a:pt x="0" y="7228702"/>
+                  <a:pt x="0" y="5622128"/>
                 </a:lnTo>
                 <a:lnTo>
                   <a:pt x="0" y="0"/>
@@ -5191,7 +5191,7 @@
         </p:nvSpPr>
         <p:spPr>
           <a:xfrm rot="0">
-            <a:off x="1219200" y="8877297"/>
+            <a:off x="8079796" y="8878411"/>
             <a:ext cx="9179504" cy="381003"/>
           </a:xfrm>
           <a:prstGeom prst="rect">
@@ -5204,7 +5204,7 @@
           </a:bodyPr>
           <a:lstStyle/>
           <a:p>
-            <a:pPr algn="just" marL="0" indent="0" lvl="1">
+            <a:pPr algn="r" marL="0" indent="0" lvl="1">
               <a:lnSpc>
                 <a:spcPts val="2700"/>
               </a:lnSpc>

</xml_diff>